<commit_message>
Zalozenie prezentacie a vytvorenie zakladu dema
</commit_message>
<xml_diff>
--- a/SOLIDPrinciples.pptx
+++ b/SOLIDPrinciples.pptx
@@ -320,7 +320,7 @@
           <a:p>
             <a:fld id="{ECD19FB2-3AAB-4D03-B13A-2960828C78E3}" type="datetimeFigureOut">
               <a:rPr lang="en-US" dirty="0"/>
-              <a:t>12/4/2017</a:t>
+              <a:t>12/5/2017</a:t>
             </a:fld>
             <a:endParaRPr lang="en-US" dirty="0"/>
           </a:p>
@@ -601,7 +601,7 @@
           <a:p>
             <a:fld id="{1B80C674-7DFC-42FE-B9CD-82963CDB1557}" type="datetimeFigureOut">
               <a:rPr lang="en-US" dirty="0"/>
-              <a:t>12/4/2017</a:t>
+              <a:t>12/5/2017</a:t>
             </a:fld>
             <a:endParaRPr lang="en-US" dirty="0"/>
           </a:p>
@@ -792,7 +792,7 @@
           <a:p>
             <a:fld id="{2076456F-F47D-4F25-8053-2A695DA0CA7D}" type="datetimeFigureOut">
               <a:rPr lang="en-US" dirty="0"/>
-              <a:t>12/4/2017</a:t>
+              <a:t>12/5/2017</a:t>
             </a:fld>
             <a:endParaRPr lang="en-US" dirty="0"/>
           </a:p>
@@ -1052,7 +1052,7 @@
           <a:p>
             <a:fld id="{5D6C7379-69CC-4837-9905-BEBA22830C8A}" type="datetimeFigureOut">
               <a:rPr lang="en-US" dirty="0"/>
-              <a:t>12/4/2017</a:t>
+              <a:t>12/5/2017</a:t>
             </a:fld>
             <a:endParaRPr lang="en-US" dirty="0"/>
           </a:p>
@@ -1477,7 +1477,7 @@
           <a:p>
             <a:fld id="{49EB8B7E-8AEE-4F10-BFEE-C999AD004D36}" type="datetimeFigureOut">
               <a:rPr lang="en-US" dirty="0"/>
-              <a:t>12/4/2017</a:t>
+              <a:t>12/5/2017</a:t>
             </a:fld>
             <a:endParaRPr lang="en-US" dirty="0"/>
           </a:p>
@@ -2022,7 +2022,7 @@
           <a:p>
             <a:fld id="{8668F3F9-58BC-440B-B37B-805B9055EF92}" type="datetimeFigureOut">
               <a:rPr lang="en-US" dirty="0"/>
-              <a:t>12/4/2017</a:t>
+              <a:t>12/5/2017</a:t>
             </a:fld>
             <a:endParaRPr lang="en-US" dirty="0"/>
           </a:p>
@@ -2852,7 +2852,7 @@
           <a:p>
             <a:fld id="{0D5A53AF-48EA-489D-8260-9DCAB666386A}" type="datetimeFigureOut">
               <a:rPr lang="en-US" dirty="0"/>
-              <a:t>12/4/2017</a:t>
+              <a:t>12/5/2017</a:t>
             </a:fld>
             <a:endParaRPr lang="en-US" dirty="0"/>
           </a:p>
@@ -3021,7 +3021,7 @@
           <a:p>
             <a:fld id="{0DED02AE-B9A4-47BD-AF8E-97E16144138B}" type="datetimeFigureOut">
               <a:rPr lang="en-US" dirty="0"/>
-              <a:t>12/4/2017</a:t>
+              <a:t>12/5/2017</a:t>
             </a:fld>
             <a:endParaRPr lang="en-US" dirty="0"/>
           </a:p>
@@ -3200,7 +3200,7 @@
           <a:p>
             <a:fld id="{CF0FD78B-DB02-4362-BCDC-98A55456977C}" type="datetimeFigureOut">
               <a:rPr lang="en-US" dirty="0"/>
-              <a:t>12/4/2017</a:t>
+              <a:t>12/5/2017</a:t>
             </a:fld>
             <a:endParaRPr lang="en-US" dirty="0"/>
           </a:p>
@@ -3369,7 +3369,7 @@
           <a:p>
             <a:fld id="{99916976-5D93-46E4-A98A-FAD63E4D0EA8}" type="datetimeFigureOut">
               <a:rPr lang="en-US" dirty="0"/>
-              <a:t>12/4/2017</a:t>
+              <a:t>12/5/2017</a:t>
             </a:fld>
             <a:endParaRPr lang="en-US" dirty="0"/>
           </a:p>
@@ -3625,7 +3625,7 @@
           <a:p>
             <a:fld id="{0F39F4F5-F4D2-4D2A-AB60-88D37ADCB869}" type="datetimeFigureOut">
               <a:rPr lang="en-US" dirty="0"/>
-              <a:t>12/4/2017</a:t>
+              <a:t>12/5/2017</a:t>
             </a:fld>
             <a:endParaRPr lang="en-US" dirty="0"/>
           </a:p>
@@ -3856,7 +3856,7 @@
           <a:p>
             <a:fld id="{D23BC6CE-6D1E-47E5-8859-F31AC5380EB2}" type="datetimeFigureOut">
               <a:rPr lang="en-US" dirty="0"/>
-              <a:t>12/4/2017</a:t>
+              <a:t>12/5/2017</a:t>
             </a:fld>
             <a:endParaRPr lang="en-US" dirty="0"/>
           </a:p>
@@ -4248,7 +4248,7 @@
           <a:p>
             <a:fld id="{B1B4E7C4-4DA4-404D-9965-B13F2DD7D8BF}" type="datetimeFigureOut">
               <a:rPr lang="en-US" dirty="0"/>
-              <a:t>12/4/2017</a:t>
+              <a:t>12/5/2017</a:t>
             </a:fld>
             <a:endParaRPr lang="en-US" dirty="0"/>
           </a:p>
@@ -4365,7 +4365,7 @@
           <a:p>
             <a:fld id="{476FB7AA-4A53-424F-AD41-70827B6504BA}" type="datetimeFigureOut">
               <a:rPr lang="en-US" dirty="0"/>
-              <a:t>12/4/2017</a:t>
+              <a:t>12/5/2017</a:t>
             </a:fld>
             <a:endParaRPr lang="en-US" dirty="0"/>
           </a:p>
@@ -4459,7 +4459,7 @@
           <a:p>
             <a:fld id="{E7884882-FB12-4BC8-9960-9AD8104D7FAE}" type="datetimeFigureOut">
               <a:rPr lang="en-US" dirty="0"/>
-              <a:t>12/4/2017</a:t>
+              <a:t>12/5/2017</a:t>
             </a:fld>
             <a:endParaRPr lang="en-US" dirty="0"/>
           </a:p>
@@ -4731,7 +4731,7 @@
           <a:p>
             <a:fld id="{F7D1BD23-6E54-4D9D-AD88-A2813C73CC25}" type="datetimeFigureOut">
               <a:rPr lang="en-US" dirty="0"/>
-              <a:t>12/4/2017</a:t>
+              <a:t>12/5/2017</a:t>
             </a:fld>
             <a:endParaRPr lang="en-US" dirty="0"/>
           </a:p>
@@ -5011,7 +5011,7 @@
           <a:p>
             <a:fld id="{1471A834-4F3C-4AF9-9C74-05EC35A0F292}" type="datetimeFigureOut">
               <a:rPr lang="en-US" dirty="0"/>
-              <a:t>12/4/2017</a:t>
+              <a:t>12/5/2017</a:t>
             </a:fld>
             <a:endParaRPr lang="en-US" dirty="0"/>
           </a:p>
@@ -5250,7 +5250,7 @@
           <a:p>
             <a:fld id="{51CF1133-3259-4C45-BABA-5B62D9C6F78D}" type="datetimeFigureOut">
               <a:rPr lang="en-US" dirty="0"/>
-              <a:t>12/4/2017</a:t>
+              <a:t>12/5/2017</a:t>
             </a:fld>
             <a:endParaRPr lang="en-US" dirty="0"/>
           </a:p>
@@ -6329,14 +6329,7 @@
                 <a:latin typeface="Segoe UI Light" panose="020B0502040204020203" pitchFamily="34" charset="0"/>
                 <a:cs typeface="Segoe UI Light" panose="020B0502040204020203" pitchFamily="34" charset="0"/>
               </a:rPr>
-              <a:t> č. </a:t>
-            </a:r>
-            <a:r>
-              <a:rPr lang="sk-SK" sz="2400" dirty="0" smtClean="0">
-                <a:latin typeface="Segoe UI Light" panose="020B0502040204020203" pitchFamily="34" charset="0"/>
-                <a:cs typeface="Segoe UI Light" panose="020B0502040204020203" pitchFamily="34" charset="0"/>
-              </a:rPr>
-              <a:t>1</a:t>
+              <a:t> č. 1</a:t>
             </a:r>
             <a:endParaRPr lang="sk-SK" sz="2400" dirty="0">
               <a:latin typeface="Segoe UI Light" panose="020B0502040204020203" pitchFamily="34" charset="0"/>
@@ -6625,7 +6618,29 @@
                 <a:latin typeface="Segoe UI Light" panose="020B0502040204020203" pitchFamily="34" charset="0"/>
                 <a:cs typeface="Segoe UI Light" panose="020B0502040204020203" pitchFamily="34" charset="0"/>
               </a:rPr>
-              <a:t>... počulo o S.O.L.I.D?</a:t>
+              <a:t>... </a:t>
+            </a:r>
+            <a:r>
+              <a:rPr lang="sk-SK" sz="5400" i="1" dirty="0" smtClean="0">
+                <a:solidFill>
+                  <a:schemeClr val="tx1"/>
+                </a:solidFill>
+                <a:effectLst/>
+                <a:latin typeface="Segoe UI Light" panose="020B0502040204020203" pitchFamily="34" charset="0"/>
+                <a:cs typeface="Segoe UI Light" panose="020B0502040204020203" pitchFamily="34" charset="0"/>
+              </a:rPr>
+              <a:t>počuli </a:t>
+            </a:r>
+            <a:r>
+              <a:rPr lang="sk-SK" sz="5400" i="1" dirty="0" smtClean="0">
+                <a:solidFill>
+                  <a:schemeClr val="tx1"/>
+                </a:solidFill>
+                <a:effectLst/>
+                <a:latin typeface="Segoe UI Light" panose="020B0502040204020203" pitchFamily="34" charset="0"/>
+                <a:cs typeface="Segoe UI Light" panose="020B0502040204020203" pitchFamily="34" charset="0"/>
+              </a:rPr>
+              <a:t>o S.O.L.I.D?</a:t>
             </a:r>
             <a:endParaRPr lang="sk-SK" sz="5400" i="1" dirty="0">
               <a:effectLst/>
@@ -6666,7 +6681,17 @@
                 <a:latin typeface="Segoe UI Light" panose="020B0502040204020203" pitchFamily="34" charset="0"/>
                 <a:cs typeface="Segoe UI Light" panose="020B0502040204020203" pitchFamily="34" charset="0"/>
               </a:rPr>
-              <a:t>Koľko z Vás ... </a:t>
+              <a:t>Koľkí </a:t>
+            </a:r>
+            <a:r>
+              <a:rPr lang="sk-SK" sz="5400" i="1" dirty="0" smtClean="0">
+                <a:solidFill>
+                  <a:schemeClr val="tx1"/>
+                </a:solidFill>
+                <a:latin typeface="Segoe UI Light" panose="020B0502040204020203" pitchFamily="34" charset="0"/>
+                <a:cs typeface="Segoe UI Light" panose="020B0502040204020203" pitchFamily="34" charset="0"/>
+              </a:rPr>
+              <a:t>z Vás ... </a:t>
             </a:r>
             <a:endParaRPr lang="sk-SK" sz="5400" i="1" dirty="0">
               <a:solidFill>
@@ -6755,7 +6780,40 @@
                 <a:latin typeface="Segoe UI Light" panose="020B0502040204020203" pitchFamily="34" charset="0"/>
                 <a:cs typeface="Segoe UI Light" panose="020B0502040204020203" pitchFamily="34" charset="0"/>
               </a:rPr>
-              <a:t>... vie vymenovať všetkých 5?</a:t>
+              <a:t>... </a:t>
+            </a:r>
+            <a:r>
+              <a:rPr lang="sk-SK" sz="5400" i="1" dirty="0" smtClean="0">
+                <a:solidFill>
+                  <a:schemeClr val="tx1"/>
+                </a:solidFill>
+                <a:effectLst/>
+                <a:latin typeface="Segoe UI Light" panose="020B0502040204020203" pitchFamily="34" charset="0"/>
+                <a:cs typeface="Segoe UI Light" panose="020B0502040204020203" pitchFamily="34" charset="0"/>
+              </a:rPr>
+              <a:t>vedia </a:t>
+            </a:r>
+            <a:r>
+              <a:rPr lang="sk-SK" sz="5400" i="1" dirty="0" smtClean="0">
+                <a:solidFill>
+                  <a:schemeClr val="tx1"/>
+                </a:solidFill>
+                <a:effectLst/>
+                <a:latin typeface="Segoe UI Light" panose="020B0502040204020203" pitchFamily="34" charset="0"/>
+                <a:cs typeface="Segoe UI Light" panose="020B0502040204020203" pitchFamily="34" charset="0"/>
+              </a:rPr>
+              <a:t>vymenovať všetkých </a:t>
+            </a:r>
+            <a:r>
+              <a:rPr lang="sk-SK" sz="5400" i="1" dirty="0" smtClean="0">
+                <a:solidFill>
+                  <a:schemeClr val="tx1"/>
+                </a:solidFill>
+                <a:effectLst/>
+                <a:latin typeface="Segoe UI Light" panose="020B0502040204020203" pitchFamily="34" charset="0"/>
+                <a:cs typeface="Segoe UI Light" panose="020B0502040204020203" pitchFamily="34" charset="0"/>
+              </a:rPr>
+              <a:t>5?</a:t>
             </a:r>
             <a:endParaRPr lang="sk-SK" sz="5400" i="1" dirty="0">
               <a:effectLst/>
@@ -6796,7 +6854,17 @@
                 <a:latin typeface="Segoe UI Light" panose="020B0502040204020203" pitchFamily="34" charset="0"/>
                 <a:cs typeface="Segoe UI Light" panose="020B0502040204020203" pitchFamily="34" charset="0"/>
               </a:rPr>
-              <a:t>Koľko z Vás ... </a:t>
+              <a:t>Koľkí </a:t>
+            </a:r>
+            <a:r>
+              <a:rPr lang="sk-SK" sz="5400" i="1" dirty="0" smtClean="0">
+                <a:solidFill>
+                  <a:schemeClr val="tx1"/>
+                </a:solidFill>
+                <a:latin typeface="Segoe UI Light" panose="020B0502040204020203" pitchFamily="34" charset="0"/>
+                <a:cs typeface="Segoe UI Light" panose="020B0502040204020203" pitchFamily="34" charset="0"/>
+              </a:rPr>
+              <a:t>z Vás ... </a:t>
             </a:r>
             <a:endParaRPr lang="sk-SK" sz="5400" i="1" dirty="0">
               <a:solidFill>
@@ -7003,7 +7071,17 @@
                 <a:latin typeface="Segoe UI Light" panose="020B0502040204020203" pitchFamily="34" charset="0"/>
                 <a:cs typeface="Segoe UI Light" panose="020B0502040204020203" pitchFamily="34" charset="0"/>
               </a:rPr>
-              <a:t>Koľko z Vás ... </a:t>
+              <a:t>Kto </a:t>
+            </a:r>
+            <a:r>
+              <a:rPr lang="sk-SK" sz="5400" i="1" dirty="0" smtClean="0">
+                <a:solidFill>
+                  <a:schemeClr val="tx1"/>
+                </a:solidFill>
+                <a:latin typeface="Segoe UI Light" panose="020B0502040204020203" pitchFamily="34" charset="0"/>
+                <a:cs typeface="Segoe UI Light" panose="020B0502040204020203" pitchFamily="34" charset="0"/>
+              </a:rPr>
+              <a:t>z Vás ... </a:t>
             </a:r>
             <a:endParaRPr lang="sk-SK" sz="5400" i="1" dirty="0">
               <a:solidFill>
@@ -7133,7 +7211,17 @@
                 <a:latin typeface="Segoe UI Light" panose="020B0502040204020203" pitchFamily="34" charset="0"/>
                 <a:cs typeface="Segoe UI Light" panose="020B0502040204020203" pitchFamily="34" charset="0"/>
               </a:rPr>
-              <a:t>Koľko z Vás ... </a:t>
+              <a:t>Kto </a:t>
+            </a:r>
+            <a:r>
+              <a:rPr lang="sk-SK" sz="5400" i="1" dirty="0" smtClean="0">
+                <a:solidFill>
+                  <a:schemeClr val="tx1"/>
+                </a:solidFill>
+                <a:latin typeface="Segoe UI Light" panose="020B0502040204020203" pitchFamily="34" charset="0"/>
+                <a:cs typeface="Segoe UI Light" panose="020B0502040204020203" pitchFamily="34" charset="0"/>
+              </a:rPr>
+              <a:t>z Vás ... </a:t>
             </a:r>
             <a:endParaRPr lang="sk-SK" sz="5400" i="1" dirty="0">
               <a:solidFill>
@@ -7222,7 +7310,51 @@
                 <a:latin typeface="Segoe UI Light" panose="020B0502040204020203" pitchFamily="34" charset="0"/>
                 <a:cs typeface="Segoe UI Light" panose="020B0502040204020203" pitchFamily="34" charset="0"/>
               </a:rPr>
-              <a:t>... si myslí, že bude stavať projekt na zelenej lúke?</a:t>
+              <a:t>... si </a:t>
+            </a:r>
+            <a:r>
+              <a:rPr lang="sk-SK" sz="5400" i="1" dirty="0" smtClean="0">
+                <a:solidFill>
+                  <a:schemeClr val="tx1"/>
+                </a:solidFill>
+                <a:effectLst/>
+                <a:latin typeface="Segoe UI Light" panose="020B0502040204020203" pitchFamily="34" charset="0"/>
+                <a:cs typeface="Segoe UI Light" panose="020B0502040204020203" pitchFamily="34" charset="0"/>
+              </a:rPr>
+              <a:t>myslia, </a:t>
+            </a:r>
+            <a:r>
+              <a:rPr lang="sk-SK" sz="5400" i="1" dirty="0" smtClean="0">
+                <a:solidFill>
+                  <a:schemeClr val="tx1"/>
+                </a:solidFill>
+                <a:effectLst/>
+                <a:latin typeface="Segoe UI Light" panose="020B0502040204020203" pitchFamily="34" charset="0"/>
+                <a:cs typeface="Segoe UI Light" panose="020B0502040204020203" pitchFamily="34" charset="0"/>
+              </a:rPr>
+              <a:t>že </a:t>
+            </a:r>
+            <a:r>
+              <a:rPr lang="sk-SK" sz="5400" i="1" dirty="0" smtClean="0">
+                <a:solidFill>
+                  <a:schemeClr val="tx1"/>
+                </a:solidFill>
+                <a:effectLst/>
+                <a:latin typeface="Segoe UI Light" panose="020B0502040204020203" pitchFamily="34" charset="0"/>
+                <a:cs typeface="Segoe UI Light" panose="020B0502040204020203" pitchFamily="34" charset="0"/>
+              </a:rPr>
+              <a:t>budú </a:t>
+            </a:r>
+            <a:r>
+              <a:rPr lang="sk-SK" sz="5400" i="1" dirty="0" smtClean="0">
+                <a:solidFill>
+                  <a:schemeClr val="tx1"/>
+                </a:solidFill>
+                <a:effectLst/>
+                <a:latin typeface="Segoe UI Light" panose="020B0502040204020203" pitchFamily="34" charset="0"/>
+                <a:cs typeface="Segoe UI Light" panose="020B0502040204020203" pitchFamily="34" charset="0"/>
+              </a:rPr>
+              <a:t>stavať projekt na zelenej lúke?</a:t>
             </a:r>
             <a:endParaRPr lang="sk-SK" sz="5400" i="1" dirty="0">
               <a:effectLst/>
@@ -7263,7 +7395,17 @@
                 <a:latin typeface="Segoe UI Light" panose="020B0502040204020203" pitchFamily="34" charset="0"/>
                 <a:cs typeface="Segoe UI Light" panose="020B0502040204020203" pitchFamily="34" charset="0"/>
               </a:rPr>
-              <a:t>Koľko z Vás ... </a:t>
+              <a:t>Koľkí </a:t>
+            </a:r>
+            <a:r>
+              <a:rPr lang="sk-SK" sz="5400" i="1" dirty="0" smtClean="0">
+                <a:solidFill>
+                  <a:schemeClr val="tx1"/>
+                </a:solidFill>
+                <a:latin typeface="Segoe UI Light" panose="020B0502040204020203" pitchFamily="34" charset="0"/>
+                <a:cs typeface="Segoe UI Light" panose="020B0502040204020203" pitchFamily="34" charset="0"/>
+              </a:rPr>
+              <a:t>z Vás ... </a:t>
             </a:r>
             <a:endParaRPr lang="sk-SK" sz="5400" i="1" dirty="0">
               <a:solidFill>
@@ -7493,7 +7635,17 @@
                 <a:latin typeface="Segoe UI Light" panose="020B0502040204020203" pitchFamily="34" charset="0"/>
                 <a:cs typeface="Segoe UI Light" panose="020B0502040204020203" pitchFamily="34" charset="0"/>
               </a:rPr>
-              <a:t>Koľko z Vás ... </a:t>
+              <a:t>Kto </a:t>
+            </a:r>
+            <a:r>
+              <a:rPr lang="sk-SK" sz="5400" i="1" dirty="0" smtClean="0">
+                <a:solidFill>
+                  <a:schemeClr val="tx1"/>
+                </a:solidFill>
+                <a:latin typeface="Segoe UI Light" panose="020B0502040204020203" pitchFamily="34" charset="0"/>
+                <a:cs typeface="Segoe UI Light" panose="020B0502040204020203" pitchFamily="34" charset="0"/>
+              </a:rPr>
+              <a:t>z Vás ... </a:t>
             </a:r>
             <a:endParaRPr lang="sk-SK" sz="5400" i="1" dirty="0">
               <a:solidFill>

</xml_diff>

<commit_message>
Pridané ďalšie poznámky a upravená prezentácia
</commit_message>
<xml_diff>
--- a/SOLIDPrinciples.pptx
+++ b/SOLIDPrinciples.pptx
@@ -8498,7 +8498,7 @@
               <a:t> na dva nové </a:t>
             </a:r>
             <a:r>
-              <a:rPr lang="sk-SK" sz="1200" b="0" kern="1200" dirty="0" err="1" smtClean="0">
+              <a:rPr lang="sk-SK" sz="1200" b="1" kern="1200" dirty="0" err="1" smtClean="0">
                 <a:solidFill>
                   <a:schemeClr val="tx1"/>
                 </a:solidFill>
@@ -8522,7 +8522,7 @@
               <a:t> a </a:t>
             </a:r>
             <a:r>
-              <a:rPr lang="sk-SK" sz="1200" b="0" kern="1200" dirty="0" err="1" smtClean="0">
+              <a:rPr lang="sk-SK" sz="1200" b="1" kern="1200" dirty="0" err="1" smtClean="0">
                 <a:solidFill>
                   <a:schemeClr val="tx1"/>
                 </a:solidFill>
@@ -8533,7 +8533,7 @@
               </a:rPr>
               <a:t>IWritablePeopleRepository</a:t>
             </a:r>
-            <a:endParaRPr lang="sk-SK" sz="1200" b="0" kern="1200" dirty="0" smtClean="0">
+            <a:endParaRPr lang="sk-SK" sz="1200" b="1" kern="1200" dirty="0" smtClean="0">
               <a:solidFill>
                 <a:schemeClr val="tx1"/>
               </a:solidFill>
@@ -8779,33 +8779,21 @@
           </a:p>
           <a:p>
             <a:r>
-              <a:rPr lang="sk-SK" sz="1200" b="0" kern="1200" smtClean="0">
-                <a:solidFill>
-                  <a:schemeClr val="tx1"/>
-                </a:solidFill>
-                <a:effectLst/>
-                <a:latin typeface="+mn-lt"/>
-                <a:ea typeface="+mn-ea"/>
-                <a:cs typeface="+mn-cs"/>
-              </a:rPr>
-              <a:t>Toto </a:t>
-            </a:r>
-            <a:r>
-              <a:rPr lang="sk-SK" sz="1200" b="0" kern="1200" dirty="0" smtClean="0">
-                <a:solidFill>
-                  <a:schemeClr val="tx1"/>
-                </a:solidFill>
-                <a:effectLst/>
-                <a:latin typeface="+mn-lt"/>
-                <a:ea typeface="+mn-ea"/>
-                <a:cs typeface="+mn-cs"/>
-              </a:rPr>
-              <a:t>nám rozviazalo ruky a môžeme jednoduchšie zapracovávať zdroje, ktoré neumožňujú ukladať dáta.</a:t>
-            </a:r>
-          </a:p>
-          <a:p>
-            <a:r>
-              <a:rPr lang="sk-SK" sz="1200" b="0" kern="1200" smtClean="0">
+              <a:rPr lang="sk-SK" sz="1200" b="0" kern="1200" dirty="0" smtClean="0">
+                <a:solidFill>
+                  <a:schemeClr val="tx1"/>
+                </a:solidFill>
+                <a:effectLst/>
+                <a:latin typeface="+mn-lt"/>
+                <a:ea typeface="+mn-ea"/>
+                <a:cs typeface="+mn-cs"/>
+              </a:rPr>
+              <a:t>Toto nám rozviazalo ruky a môžeme jednoduchšie zapracovávať zdroje, ktoré neumožňujú ukladať dáta.</a:t>
+            </a:r>
+          </a:p>
+          <a:p>
+            <a:r>
+              <a:rPr lang="sk-SK" sz="1200" b="0" kern="1200" dirty="0" err="1" smtClean="0">
                 <a:solidFill>
                   <a:schemeClr val="tx1"/>
                 </a:solidFill>

</xml_diff>

<commit_message>
Uprava division na department
</commit_message>
<xml_diff>
--- a/SOLIDPrinciples.pptx
+++ b/SOLIDPrinciples.pptx
@@ -242,7 +242,7 @@
           <a:p>
             <a:fld id="{B6797C0A-B3BF-45C1-AF59-5C8973714672}" type="datetimeFigureOut">
               <a:rPr lang="sk-SK" smtClean="0"/>
-              <a:t>9. 12. 2017</a:t>
+              <a:t>10. 12. 2017</a:t>
             </a:fld>
             <a:endParaRPr lang="sk-SK"/>
           </a:p>
@@ -8991,19 +8991,7 @@
                 <a:ea typeface="+mn-ea"/>
                 <a:cs typeface="+mn-cs"/>
               </a:rPr>
-              <a:t>Nemusíme implementovať veci, ktoré sú v našom kontexte </a:t>
-            </a:r>
-            <a:r>
-              <a:rPr lang="sk-SK" sz="1200" b="0" kern="1200" baseline="0" dirty="0" smtClean="0">
-                <a:solidFill>
-                  <a:schemeClr val="tx1"/>
-                </a:solidFill>
-                <a:effectLst/>
-                <a:latin typeface="+mn-lt"/>
-                <a:ea typeface="+mn-ea"/>
-                <a:cs typeface="+mn-cs"/>
-              </a:rPr>
-              <a:t>nepotrebné. Nemusím sa o to starať.</a:t>
+              <a:t>Nemusíme implementovať veci, ktoré sú v našom kontexte nepotrebné. Nemusím sa o to starať.</a:t>
             </a:r>
           </a:p>
           <a:p>
@@ -10224,7 +10212,7 @@
                 <a:ea typeface="+mn-ea"/>
                 <a:cs typeface="+mn-cs"/>
               </a:rPr>
-              <a:t>WebPeopleRepository</a:t>
+              <a:t>PeopleRepository</a:t>
             </a:r>
             <a:r>
               <a:rPr lang="sk-SK" sz="1200" b="0" kern="1200" baseline="0" dirty="0" smtClean="0">
@@ -10238,6 +10226,15 @@
               </a:rPr>
               <a:t>.</a:t>
             </a:r>
+            <a:endParaRPr lang="sk-SK" sz="1200" b="0" kern="1200" baseline="0" dirty="0" smtClean="0">
+              <a:solidFill>
+                <a:schemeClr val="tx1"/>
+              </a:solidFill>
+              <a:effectLst/>
+              <a:latin typeface="+mn-lt"/>
+              <a:ea typeface="+mn-ea"/>
+              <a:cs typeface="+mn-cs"/>
+            </a:endParaRPr>
           </a:p>
           <a:p>
             <a:r>
@@ -10262,7 +10259,7 @@
                 <a:ea typeface="+mn-ea"/>
                 <a:cs typeface="+mn-cs"/>
               </a:rPr>
-              <a:t>IWebClient</a:t>
+              <a:t>IDatabase</a:t>
             </a:r>
             <a:r>
               <a:rPr lang="sk-SK" sz="1200" b="0" kern="1200" baseline="0" dirty="0" smtClean="0">
@@ -10276,6 +10273,15 @@
               </a:rPr>
               <a:t>.</a:t>
             </a:r>
+            <a:endParaRPr lang="sk-SK" sz="1200" b="0" kern="1200" baseline="0" dirty="0" smtClean="0">
+              <a:solidFill>
+                <a:schemeClr val="tx1"/>
+              </a:solidFill>
+              <a:effectLst/>
+              <a:latin typeface="+mn-lt"/>
+              <a:ea typeface="+mn-ea"/>
+              <a:cs typeface="+mn-cs"/>
+            </a:endParaRPr>
           </a:p>
           <a:p>
             <a:r>
@@ -10300,7 +10306,7 @@
                 <a:ea typeface="+mn-ea"/>
                 <a:cs typeface="+mn-cs"/>
               </a:rPr>
-              <a:t>webPeopleRepository</a:t>
+              <a:t>PeopleRepositry</a:t>
             </a:r>
             <a:r>
               <a:rPr lang="sk-SK" sz="1200" b="0" kern="1200" baseline="0" dirty="0" smtClean="0">
@@ -10312,7 +10318,19 @@
                 <a:ea typeface="+mn-ea"/>
                 <a:cs typeface="+mn-cs"/>
               </a:rPr>
-              <a:t> vymenili tú </a:t>
+              <a:t> </a:t>
+            </a:r>
+            <a:r>
+              <a:rPr lang="sk-SK" sz="1200" b="0" kern="1200" baseline="0" dirty="0" smtClean="0">
+                <a:solidFill>
+                  <a:schemeClr val="tx1"/>
+                </a:solidFill>
+                <a:effectLst/>
+                <a:latin typeface="+mn-lt"/>
+                <a:ea typeface="+mn-ea"/>
+                <a:cs typeface="+mn-cs"/>
+              </a:rPr>
+              <a:t>vymenili tú </a:t>
             </a:r>
             <a:r>
               <a:rPr lang="sk-SK" sz="1200" b="0" kern="1200" baseline="0" dirty="0" err="1" smtClean="0">
@@ -13223,7 +13241,7 @@
           <a:p>
             <a:fld id="{ECD19FB2-3AAB-4D03-B13A-2960828C78E3}" type="datetimeFigureOut">
               <a:rPr lang="en-US" dirty="0"/>
-              <a:t>12/9/2017</a:t>
+              <a:t>12/10/2017</a:t>
             </a:fld>
             <a:endParaRPr lang="en-US" dirty="0"/>
           </a:p>
@@ -13504,7 +13522,7 @@
           <a:p>
             <a:fld id="{1B80C674-7DFC-42FE-B9CD-82963CDB1557}" type="datetimeFigureOut">
               <a:rPr lang="en-US" dirty="0"/>
-              <a:t>12/9/2017</a:t>
+              <a:t>12/10/2017</a:t>
             </a:fld>
             <a:endParaRPr lang="en-US" dirty="0"/>
           </a:p>
@@ -13695,7 +13713,7 @@
           <a:p>
             <a:fld id="{2076456F-F47D-4F25-8053-2A695DA0CA7D}" type="datetimeFigureOut">
               <a:rPr lang="en-US" dirty="0"/>
-              <a:t>12/9/2017</a:t>
+              <a:t>12/10/2017</a:t>
             </a:fld>
             <a:endParaRPr lang="en-US" dirty="0"/>
           </a:p>
@@ -13955,7 +13973,7 @@
           <a:p>
             <a:fld id="{5D6C7379-69CC-4837-9905-BEBA22830C8A}" type="datetimeFigureOut">
               <a:rPr lang="en-US" dirty="0"/>
-              <a:t>12/9/2017</a:t>
+              <a:t>12/10/2017</a:t>
             </a:fld>
             <a:endParaRPr lang="en-US" dirty="0"/>
           </a:p>
@@ -14380,7 +14398,7 @@
           <a:p>
             <a:fld id="{49EB8B7E-8AEE-4F10-BFEE-C999AD004D36}" type="datetimeFigureOut">
               <a:rPr lang="en-US" dirty="0"/>
-              <a:t>12/9/2017</a:t>
+              <a:t>12/10/2017</a:t>
             </a:fld>
             <a:endParaRPr lang="en-US" dirty="0"/>
           </a:p>
@@ -14925,7 +14943,7 @@
           <a:p>
             <a:fld id="{8668F3F9-58BC-440B-B37B-805B9055EF92}" type="datetimeFigureOut">
               <a:rPr lang="en-US" dirty="0"/>
-              <a:t>12/9/2017</a:t>
+              <a:t>12/10/2017</a:t>
             </a:fld>
             <a:endParaRPr lang="en-US" dirty="0"/>
           </a:p>
@@ -15755,7 +15773,7 @@
           <a:p>
             <a:fld id="{0D5A53AF-48EA-489D-8260-9DCAB666386A}" type="datetimeFigureOut">
               <a:rPr lang="en-US" dirty="0"/>
-              <a:t>12/9/2017</a:t>
+              <a:t>12/10/2017</a:t>
             </a:fld>
             <a:endParaRPr lang="en-US" dirty="0"/>
           </a:p>
@@ -15924,7 +15942,7 @@
           <a:p>
             <a:fld id="{0DED02AE-B9A4-47BD-AF8E-97E16144138B}" type="datetimeFigureOut">
               <a:rPr lang="en-US" dirty="0"/>
-              <a:t>12/9/2017</a:t>
+              <a:t>12/10/2017</a:t>
             </a:fld>
             <a:endParaRPr lang="en-US" dirty="0"/>
           </a:p>
@@ -16103,7 +16121,7 @@
           <a:p>
             <a:fld id="{CF0FD78B-DB02-4362-BCDC-98A55456977C}" type="datetimeFigureOut">
               <a:rPr lang="en-US" dirty="0"/>
-              <a:t>12/9/2017</a:t>
+              <a:t>12/10/2017</a:t>
             </a:fld>
             <a:endParaRPr lang="en-US" dirty="0"/>
           </a:p>
@@ -16272,7 +16290,7 @@
           <a:p>
             <a:fld id="{99916976-5D93-46E4-A98A-FAD63E4D0EA8}" type="datetimeFigureOut">
               <a:rPr lang="en-US" dirty="0"/>
-              <a:t>12/9/2017</a:t>
+              <a:t>12/10/2017</a:t>
             </a:fld>
             <a:endParaRPr lang="en-US" dirty="0"/>
           </a:p>
@@ -16528,7 +16546,7 @@
           <a:p>
             <a:fld id="{0F39F4F5-F4D2-4D2A-AB60-88D37ADCB869}" type="datetimeFigureOut">
               <a:rPr lang="en-US" dirty="0"/>
-              <a:t>12/9/2017</a:t>
+              <a:t>12/10/2017</a:t>
             </a:fld>
             <a:endParaRPr lang="en-US" dirty="0"/>
           </a:p>
@@ -16759,7 +16777,7 @@
           <a:p>
             <a:fld id="{D23BC6CE-6D1E-47E5-8859-F31AC5380EB2}" type="datetimeFigureOut">
               <a:rPr lang="en-US" dirty="0"/>
-              <a:t>12/9/2017</a:t>
+              <a:t>12/10/2017</a:t>
             </a:fld>
             <a:endParaRPr lang="en-US" dirty="0"/>
           </a:p>
@@ -17151,7 +17169,7 @@
           <a:p>
             <a:fld id="{B1B4E7C4-4DA4-404D-9965-B13F2DD7D8BF}" type="datetimeFigureOut">
               <a:rPr lang="en-US" dirty="0"/>
-              <a:t>12/9/2017</a:t>
+              <a:t>12/10/2017</a:t>
             </a:fld>
             <a:endParaRPr lang="en-US" dirty="0"/>
           </a:p>
@@ -17268,7 +17286,7 @@
           <a:p>
             <a:fld id="{476FB7AA-4A53-424F-AD41-70827B6504BA}" type="datetimeFigureOut">
               <a:rPr lang="en-US" dirty="0"/>
-              <a:t>12/9/2017</a:t>
+              <a:t>12/10/2017</a:t>
             </a:fld>
             <a:endParaRPr lang="en-US" dirty="0"/>
           </a:p>
@@ -17362,7 +17380,7 @@
           <a:p>
             <a:fld id="{E7884882-FB12-4BC8-9960-9AD8104D7FAE}" type="datetimeFigureOut">
               <a:rPr lang="en-US" dirty="0"/>
-              <a:t>12/9/2017</a:t>
+              <a:t>12/10/2017</a:t>
             </a:fld>
             <a:endParaRPr lang="en-US" dirty="0"/>
           </a:p>
@@ -17634,7 +17652,7 @@
           <a:p>
             <a:fld id="{F7D1BD23-6E54-4D9D-AD88-A2813C73CC25}" type="datetimeFigureOut">
               <a:rPr lang="en-US" dirty="0"/>
-              <a:t>12/9/2017</a:t>
+              <a:t>12/10/2017</a:t>
             </a:fld>
             <a:endParaRPr lang="en-US" dirty="0"/>
           </a:p>
@@ -17914,7 +17932,7 @@
           <a:p>
             <a:fld id="{1471A834-4F3C-4AF9-9C74-05EC35A0F292}" type="datetimeFigureOut">
               <a:rPr lang="en-US" dirty="0"/>
-              <a:t>12/9/2017</a:t>
+              <a:t>12/10/2017</a:t>
             </a:fld>
             <a:endParaRPr lang="en-US" dirty="0"/>
           </a:p>
@@ -18153,7 +18171,7 @@
           <a:p>
             <a:fld id="{51CF1133-3259-4C45-BABA-5B62D9C6F78D}" type="datetimeFigureOut">
               <a:rPr lang="en-US" dirty="0"/>
-              <a:t>12/9/2017</a:t>
+              <a:t>12/10/2017</a:t>
             </a:fld>
             <a:endParaRPr lang="en-US" dirty="0"/>
           </a:p>
@@ -23019,7 +23037,21 @@
                 <a:latin typeface="Segoe UI Light" panose="020B0502040204020203" pitchFamily="34" charset="0"/>
                 <a:cs typeface="Segoe UI Light" panose="020B0502040204020203" pitchFamily="34" charset="0"/>
               </a:rPr>
-              <a:t> prvý krát prezentovala</a:t>
+              <a:t> </a:t>
+            </a:r>
+            <a:r>
+              <a:rPr lang="sk-SK" sz="2400" dirty="0" smtClean="0">
+                <a:latin typeface="Segoe UI Light" panose="020B0502040204020203" pitchFamily="34" charset="0"/>
+                <a:cs typeface="Segoe UI Light" panose="020B0502040204020203" pitchFamily="34" charset="0"/>
+              </a:rPr>
+              <a:t>prvýkrát </a:t>
+            </a:r>
+            <a:r>
+              <a:rPr lang="sk-SK" sz="2400" dirty="0">
+                <a:latin typeface="Segoe UI Light" panose="020B0502040204020203" pitchFamily="34" charset="0"/>
+                <a:cs typeface="Segoe UI Light" panose="020B0502040204020203" pitchFamily="34" charset="0"/>
+              </a:rPr>
+              <a:t>prezentovala</a:t>
             </a:r>
           </a:p>
         </p:txBody>
@@ -24849,7 +24881,7 @@
               <a:t>tried </a:t>
             </a:r>
             <a:r>
-              <a:rPr lang="sk-SK" sz="5400" i="1" dirty="0">
+              <a:rPr lang="en-US" sz="5400" i="1" dirty="0" err="1" smtClean="0">
                 <a:solidFill>
                   <a:schemeClr val="tx1"/>
                 </a:solidFill>
@@ -24857,7 +24889,40 @@
                 <a:latin typeface="Segoe UI Light" panose="020B0502040204020203" pitchFamily="34" charset="0"/>
                 <a:cs typeface="Segoe UI Light" panose="020B0502040204020203" pitchFamily="34" charset="0"/>
               </a:rPr>
-              <a:t>nízkej úrovne. Obe by mali závisieť od abstrakcií</a:t>
+              <a:t>ni</a:t>
+            </a:r>
+            <a:r>
+              <a:rPr lang="sk-SK" sz="5400" i="1" dirty="0" err="1" smtClean="0">
+                <a:solidFill>
+                  <a:schemeClr val="tx1"/>
+                </a:solidFill>
+                <a:effectLst/>
+                <a:latin typeface="Segoe UI Light" panose="020B0502040204020203" pitchFamily="34" charset="0"/>
+                <a:cs typeface="Segoe UI Light" panose="020B0502040204020203" pitchFamily="34" charset="0"/>
+              </a:rPr>
+              <a:t>žšej</a:t>
+            </a:r>
+            <a:r>
+              <a:rPr lang="sk-SK" sz="5400" i="1" dirty="0" smtClean="0">
+                <a:solidFill>
+                  <a:schemeClr val="tx1"/>
+                </a:solidFill>
+                <a:effectLst/>
+                <a:latin typeface="Segoe UI Light" panose="020B0502040204020203" pitchFamily="34" charset="0"/>
+                <a:cs typeface="Segoe UI Light" panose="020B0502040204020203" pitchFamily="34" charset="0"/>
+              </a:rPr>
+              <a:t> </a:t>
+            </a:r>
+            <a:r>
+              <a:rPr lang="sk-SK" sz="5400" i="1" dirty="0">
+                <a:solidFill>
+                  <a:schemeClr val="tx1"/>
+                </a:solidFill>
+                <a:effectLst/>
+                <a:latin typeface="Segoe UI Light" panose="020B0502040204020203" pitchFamily="34" charset="0"/>
+                <a:cs typeface="Segoe UI Light" panose="020B0502040204020203" pitchFamily="34" charset="0"/>
+              </a:rPr>
+              <a:t>úrovne. Obe by mali závisieť od abstrakcií</a:t>
             </a:r>
             <a:r>
               <a:rPr lang="sk-SK" sz="5400" i="1" dirty="0" smtClean="0">
@@ -25351,7 +25416,7 @@
                 <a:latin typeface="Segoe UI Light" panose="020B0502040204020203" pitchFamily="34" charset="0"/>
                 <a:cs typeface="Segoe UI Light" panose="020B0502040204020203" pitchFamily="34" charset="0"/>
               </a:rPr>
-              <a:t>WebPeopleRepository</a:t>
+              <a:t>PeopleRepository</a:t>
             </a:r>
             <a:endParaRPr lang="sk-SK" dirty="0" smtClean="0">
               <a:latin typeface="Segoe UI Light" panose="020B0502040204020203" pitchFamily="34" charset="0"/>
@@ -25407,7 +25472,7 @@
                 <a:latin typeface="Segoe UI Light" panose="020B0502040204020203" pitchFamily="34" charset="0"/>
                 <a:cs typeface="Segoe UI Light" panose="020B0502040204020203" pitchFamily="34" charset="0"/>
               </a:rPr>
-              <a:t>IWebClient</a:t>
+              <a:t>IDatabase</a:t>
             </a:r>
             <a:endParaRPr lang="sk-SK" dirty="0" smtClean="0">
               <a:latin typeface="Segoe UI Light" panose="020B0502040204020203" pitchFamily="34" charset="0"/>
@@ -25463,7 +25528,7 @@
                 <a:latin typeface="Segoe UI Light" panose="020B0502040204020203" pitchFamily="34" charset="0"/>
                 <a:cs typeface="Segoe UI Light" panose="020B0502040204020203" pitchFamily="34" charset="0"/>
               </a:rPr>
-              <a:t>WebClient</a:t>
+              <a:t>Database</a:t>
             </a:r>
             <a:endParaRPr lang="sk-SK" dirty="0" smtClean="0">
               <a:latin typeface="Segoe UI Light" panose="020B0502040204020203" pitchFamily="34" charset="0"/>
@@ -26068,14 +26133,7 @@
                 <a:latin typeface="Segoe UI Light" panose="020B0502040204020203" pitchFamily="34" charset="0"/>
                 <a:cs typeface="Segoe UI Light" panose="020B0502040204020203" pitchFamily="34" charset="0"/>
               </a:rPr>
-              <a:t>DEMO: Úprava podľa </a:t>
-            </a:r>
-            <a:r>
-              <a:rPr lang="sk-SK" sz="4400" dirty="0" smtClean="0">
-                <a:latin typeface="Segoe UI Light" panose="020B0502040204020203" pitchFamily="34" charset="0"/>
-                <a:cs typeface="Segoe UI Light" panose="020B0502040204020203" pitchFamily="34" charset="0"/>
-              </a:rPr>
-              <a:t>DIP</a:t>
+              <a:t>DEMO: Úprava podľa DIP</a:t>
             </a:r>
             <a:endParaRPr lang="sk-SK" sz="4400" dirty="0">
               <a:latin typeface="Segoe UI Light" panose="020B0502040204020203" pitchFamily="34" charset="0"/>

</xml_diff>